<commit_message>
github classroom instructions and updates
</commit_message>
<xml_diff>
--- a/slides/WhatIsAGame.pptx
+++ b/slides/WhatIsAGame.pptx
@@ -5,10 +5,10 @@
     <p:sldMasterId id="2147483648" r:id="rId1"/>
   </p:sldMasterIdLst>
   <p:notesMasterIdLst>
-    <p:notesMasterId r:id="rId22"/>
+    <p:notesMasterId r:id="rId24"/>
   </p:notesMasterIdLst>
   <p:handoutMasterIdLst>
-    <p:handoutMasterId r:id="rId23"/>
+    <p:handoutMasterId r:id="rId25"/>
   </p:handoutMasterIdLst>
   <p:sldIdLst>
     <p:sldId id="283" r:id="rId2"/>
@@ -19,18 +19,20 @@
     <p:sldId id="288" r:id="rId7"/>
     <p:sldId id="289" r:id="rId8"/>
     <p:sldId id="290" r:id="rId9"/>
-    <p:sldId id="291" r:id="rId10"/>
-    <p:sldId id="293" r:id="rId11"/>
+    <p:sldId id="293" r:id="rId10"/>
+    <p:sldId id="291" r:id="rId11"/>
     <p:sldId id="314" r:id="rId12"/>
     <p:sldId id="313" r:id="rId13"/>
     <p:sldId id="315" r:id="rId14"/>
     <p:sldId id="316" r:id="rId15"/>
     <p:sldId id="294" r:id="rId16"/>
-    <p:sldId id="298" r:id="rId17"/>
-    <p:sldId id="299" r:id="rId18"/>
-    <p:sldId id="300" r:id="rId19"/>
-    <p:sldId id="301" r:id="rId20"/>
-    <p:sldId id="295" r:id="rId21"/>
+    <p:sldId id="317" r:id="rId17"/>
+    <p:sldId id="318" r:id="rId18"/>
+    <p:sldId id="298" r:id="rId19"/>
+    <p:sldId id="299" r:id="rId20"/>
+    <p:sldId id="300" r:id="rId21"/>
+    <p:sldId id="301" r:id="rId22"/>
+    <p:sldId id="295" r:id="rId23"/>
   </p:sldIdLst>
   <p:sldSz cx="9144000" cy="6858000" type="screen4x3"/>
   <p:notesSz cx="7099300" cy="9385300"/>
@@ -4070,25 +4072,24 @@
           <a:p>
             <a:r>
               <a:rPr lang="en-US" dirty="0"/>
-              <a:t>Escapism</a:t>
-            </a:r>
-          </a:p>
-          <a:p>
-            <a:r>
-              <a:rPr lang="en-US" dirty="0"/>
-              <a:t>Narrative</a:t>
-            </a:r>
-          </a:p>
-          <a:p>
-            <a:r>
-              <a:rPr lang="en-US" dirty="0"/>
-              <a:t>Victory</a:t>
-            </a:r>
-          </a:p>
-          <a:p>
-            <a:r>
-              <a:rPr lang="en-US" dirty="0"/>
-              <a:t>(a whole lot more…)</a:t>
+              <a:t>Ok, that is games. What about </a:t>
+            </a:r>
+            <a:r>
+              <a:rPr lang="en-US" b="1" i="1" u="sng" dirty="0"/>
+              <a:t>players</a:t>
+            </a:r>
+            <a:r>
+              <a:rPr lang="en-US" dirty="0"/>
+              <a:t>?</a:t>
+            </a:r>
+          </a:p>
+          <a:p>
+            <a:endParaRPr lang="en-US" dirty="0"/>
+          </a:p>
+          <a:p>
+            <a:r>
+              <a:rPr lang="en-US" dirty="0"/>
+              <a:t>Why do you play games?  Or why do people play games in general?</a:t>
             </a:r>
           </a:p>
         </p:txBody>
@@ -4120,7 +4121,7 @@
     </p:spTree>
     <p:extLst>
       <p:ext uri="{BB962C8B-B14F-4D97-AF65-F5344CB8AC3E}">
-        <p14:creationId xmlns:p14="http://schemas.microsoft.com/office/powerpoint/2010/main" val="1595411137"/>
+        <p14:creationId xmlns:p14="http://schemas.microsoft.com/office/powerpoint/2010/main" val="2936056178"/>
       </p:ext>
     </p:extLst>
   </p:cSld>
@@ -4740,7 +4741,7 @@
           <a:p>
             <a:r>
               <a:rPr lang="en-US" dirty="0"/>
-              <a:t>“I play it for the story”</a:t>
+              <a:t>Summary</a:t>
             </a:r>
           </a:p>
         </p:txBody>
@@ -4762,36 +4763,48 @@
           <a:p>
             <a:r>
               <a:rPr lang="en-US" dirty="0"/>
-              <a:t>See, I bet most of you started thinking about video games…</a:t>
-            </a:r>
-          </a:p>
-          <a:p>
-            <a:r>
-              <a:rPr lang="en-US" dirty="0"/>
-              <a:t>But let’s back up</a:t>
-            </a:r>
-          </a:p>
-          <a:p>
-            <a:r>
-              <a:rPr lang="en-US" dirty="0"/>
-              <a:t>How about that riveting story in </a:t>
-            </a:r>
-            <a:r>
-              <a:rPr lang="en-US" i="1" dirty="0"/>
-              <a:t>Chutes and Ladders?  Candy Land?  Monopoly?</a:t>
-            </a:r>
-          </a:p>
-          <a:p>
-            <a:r>
-              <a:rPr lang="en-US" dirty="0"/>
-              <a:t>Okay, now video games…</a:t>
+              <a:t>So we have a basic, first </a:t>
+            </a:r>
+            <a:r>
+              <a:rPr lang="en-US" b="1" i="1" u="sng" dirty="0"/>
+              <a:t>definition of a game</a:t>
+            </a:r>
+          </a:p>
+          <a:p>
+            <a:r>
+              <a:rPr lang="en-US" dirty="0"/>
+              <a:t>… and we have an initial understanding /</a:t>
+            </a:r>
+            <a:r>
+              <a:rPr lang="en-US" b="1" i="1" u="sng" dirty="0"/>
+              <a:t> taxonomy of players</a:t>
+            </a:r>
+          </a:p>
+          <a:p>
+            <a:endParaRPr lang="en-US" b="1" i="1" u="sng" dirty="0"/>
+          </a:p>
+          <a:p>
+            <a:r>
+              <a:rPr lang="en-US" dirty="0"/>
+              <a:t>Last thing that might be of interest:</a:t>
             </a:r>
           </a:p>
           <a:p>
             <a:pPr lvl="1"/>
             <a:r>
-              <a:rPr lang="en-US" dirty="0"/>
-              <a:t>Exactly how many times has Princess Peach been kidnapped?  Is it even a crime anymore?</a:t>
+              <a:rPr lang="en-US" b="1" i="1" u="sng" dirty="0"/>
+              <a:t>Interactivity</a:t>
+            </a:r>
+            <a:r>
+              <a:rPr lang="en-US" dirty="0"/>
+              <a:t>: How much the player has agency over the game’s outcome / result.</a:t>
+            </a:r>
+          </a:p>
+          <a:p>
+            <a:pPr lvl="1"/>
+            <a:r>
+              <a:rPr lang="en-US" dirty="0"/>
+              <a:t>Not really part of our definitions yet. Let’s discuss.</a:t>
             </a:r>
           </a:p>
         </p:txBody>
@@ -4867,7 +4880,7 @@
           <a:p>
             <a:r>
               <a:rPr lang="en-US" dirty="0"/>
-              <a:t>“I play it for the story”</a:t>
+              <a:t>Possible Scale</a:t>
             </a:r>
           </a:p>
         </p:txBody>
@@ -4889,27 +4902,72 @@
           <a:p>
             <a:r>
               <a:rPr lang="en-US" dirty="0"/>
-              <a:t>What drives you to play a certain game?</a:t>
-            </a:r>
-          </a:p>
-          <a:p>
-            <a:r>
-              <a:rPr lang="en-US" dirty="0"/>
-              <a:t>Do you play a game solely for the story/lore?</a:t>
-            </a:r>
-          </a:p>
-          <a:p>
-            <a:r>
-              <a:rPr lang="en-US" dirty="0"/>
-              <a:t>Or do you play the game for the mechanics/</a:t>
-            </a:r>
-            <a:r>
-              <a:rPr lang="en-US" dirty="0" err="1"/>
-              <a:t>playstyle</a:t>
-            </a:r>
-            <a:r>
-              <a:rPr lang="en-US" dirty="0"/>
-              <a:t>?</a:t>
+              <a:t>On one end: </a:t>
+            </a:r>
+            <a:r>
+              <a:rPr lang="en-US" b="1" i="1" u="sng" dirty="0"/>
+              <a:t>Low Interactivity</a:t>
+            </a:r>
+          </a:p>
+          <a:p>
+            <a:pPr lvl="1"/>
+            <a:r>
+              <a:rPr lang="en-US" dirty="0"/>
+              <a:t>Extreme = a movie</a:t>
+            </a:r>
+          </a:p>
+          <a:p>
+            <a:pPr lvl="1"/>
+            <a:r>
+              <a:rPr lang="en-US" dirty="0"/>
+              <a:t>Or a game where you watch long cutscenes and click a button or two. </a:t>
+            </a:r>
+          </a:p>
+          <a:p>
+            <a:pPr lvl="2"/>
+            <a:r>
+              <a:rPr lang="en-US" dirty="0"/>
+              <a:t>Was </a:t>
+            </a:r>
+            <a:r>
+              <a:rPr lang="en-US" b="1" i="1" u="sng" dirty="0"/>
+              <a:t>Black Mirror: Bandersnatch</a:t>
+            </a:r>
+            <a:r>
+              <a:rPr lang="en-US" dirty="0"/>
+              <a:t> a game?</a:t>
+            </a:r>
+          </a:p>
+          <a:p>
+            <a:r>
+              <a:rPr lang="en-US" dirty="0"/>
+              <a:t>Other end: </a:t>
+            </a:r>
+            <a:r>
+              <a:rPr lang="en-US" b="1" i="1" u="sng" dirty="0"/>
+              <a:t>High Interactivity</a:t>
+            </a:r>
+          </a:p>
+          <a:p>
+            <a:pPr lvl="1"/>
+            <a:r>
+              <a:rPr lang="en-US" dirty="0"/>
+              <a:t>You can do </a:t>
+            </a:r>
+            <a:r>
+              <a:rPr lang="en-US" b="1" i="1" u="sng" dirty="0"/>
+              <a:t>ANYTHING</a:t>
+            </a:r>
+            <a:r>
+              <a:rPr lang="en-US" dirty="0"/>
+              <a:t> you want in this world</a:t>
+            </a:r>
+          </a:p>
+          <a:p>
+            <a:pPr lvl="1"/>
+            <a:r>
+              <a:rPr lang="en-US" dirty="0"/>
+              <a:t>Grand Theft Auto, open-world games maybe best examples.</a:t>
             </a:r>
           </a:p>
         </p:txBody>
@@ -4941,7 +4999,7 @@
     </p:spTree>
     <p:extLst>
       <p:ext uri="{BB962C8B-B14F-4D97-AF65-F5344CB8AC3E}">
-        <p14:creationId xmlns:p14="http://schemas.microsoft.com/office/powerpoint/2010/main" val="458765557"/>
+        <p14:creationId xmlns:p14="http://schemas.microsoft.com/office/powerpoint/2010/main" val="2141186170"/>
       </p:ext>
     </p:extLst>
   </p:cSld>
@@ -5007,19 +5065,36 @@
           <a:p>
             <a:r>
               <a:rPr lang="en-US" dirty="0"/>
-              <a:t>Are games a vehicle for telling a story?</a:t>
-            </a:r>
-          </a:p>
-          <a:p>
-            <a:r>
-              <a:rPr lang="en-US" dirty="0"/>
-              <a:t>Or are games about how we empower the player to do things they don’t normally get to do?</a:t>
-            </a:r>
-          </a:p>
-          <a:p>
-            <a:r>
-              <a:rPr lang="en-US" dirty="0"/>
-              <a:t>Is it the author’s voice we care about, or is it the gamers?</a:t>
+              <a:t>See, I bet most of you started thinking about video games…</a:t>
+            </a:r>
+          </a:p>
+          <a:p>
+            <a:r>
+              <a:rPr lang="en-US" dirty="0"/>
+              <a:t>But let’s back up</a:t>
+            </a:r>
+          </a:p>
+          <a:p>
+            <a:r>
+              <a:rPr lang="en-US" dirty="0"/>
+              <a:t>How about that riveting story in </a:t>
+            </a:r>
+            <a:r>
+              <a:rPr lang="en-US" i="1" dirty="0"/>
+              <a:t>Chutes and Ladders?  Candy Land?  Monopoly?</a:t>
+            </a:r>
+          </a:p>
+          <a:p>
+            <a:r>
+              <a:rPr lang="en-US" dirty="0"/>
+              <a:t>Okay, now video games…</a:t>
+            </a:r>
+          </a:p>
+          <a:p>
+            <a:pPr lvl="1"/>
+            <a:r>
+              <a:rPr lang="en-US" dirty="0"/>
+              <a:t>Exactly how many times has Princess Peach been kidnapped?  Is it even a crime anymore?</a:t>
             </a:r>
           </a:p>
         </p:txBody>
@@ -5051,7 +5126,7 @@
     </p:spTree>
     <p:extLst>
       <p:ext uri="{BB962C8B-B14F-4D97-AF65-F5344CB8AC3E}">
-        <p14:creationId xmlns:p14="http://schemas.microsoft.com/office/powerpoint/2010/main" val="1420564653"/>
+        <p14:creationId xmlns:p14="http://schemas.microsoft.com/office/powerpoint/2010/main" val="3575191868"/>
       </p:ext>
     </p:extLst>
   </p:cSld>
@@ -5117,19 +5192,27 @@
           <a:p>
             <a:r>
               <a:rPr lang="en-US" dirty="0"/>
-              <a:t>Name a game where the author’s voice is paramount – over that of the player’s.</a:t>
-            </a:r>
-          </a:p>
-          <a:p>
-            <a:r>
-              <a:rPr lang="en-US" dirty="0"/>
-              <a:t>Name a game where the player’s voice is paramount – over that of the author’s.</a:t>
-            </a:r>
-          </a:p>
-          <a:p>
-            <a:r>
-              <a:rPr lang="en-US" dirty="0"/>
-              <a:t>What characteristics do the two types of games have?</a:t>
+              <a:t>What drives you to play a certain game?</a:t>
+            </a:r>
+          </a:p>
+          <a:p>
+            <a:r>
+              <a:rPr lang="en-US" dirty="0"/>
+              <a:t>Do you play a game solely for the story/lore?</a:t>
+            </a:r>
+          </a:p>
+          <a:p>
+            <a:r>
+              <a:rPr lang="en-US" dirty="0"/>
+              <a:t>Or do you play the game for the mechanics/</a:t>
+            </a:r>
+            <a:r>
+              <a:rPr lang="en-US" dirty="0" err="1"/>
+              <a:t>playstyle</a:t>
+            </a:r>
+            <a:r>
+              <a:rPr lang="en-US" dirty="0"/>
+              <a:t>?</a:t>
             </a:r>
           </a:p>
         </p:txBody>
@@ -5161,7 +5244,7 @@
     </p:spTree>
     <p:extLst>
       <p:ext uri="{BB962C8B-B14F-4D97-AF65-F5344CB8AC3E}">
-        <p14:creationId xmlns:p14="http://schemas.microsoft.com/office/powerpoint/2010/main" val="3967105160"/>
+        <p14:creationId xmlns:p14="http://schemas.microsoft.com/office/powerpoint/2010/main" val="458765557"/>
       </p:ext>
     </p:extLst>
   </p:cSld>
@@ -5205,7 +5288,7 @@
           <a:p>
             <a:r>
               <a:rPr lang="en-US" dirty="0"/>
-              <a:t>Beware the Extremes</a:t>
+              <a:t>“I play it for the story”</a:t>
             </a:r>
           </a:p>
         </p:txBody>
@@ -5227,19 +5310,19 @@
           <a:p>
             <a:r>
               <a:rPr lang="en-US" dirty="0"/>
-              <a:t>Either extreme is dangerous.</a:t>
-            </a:r>
-          </a:p>
-          <a:p>
-            <a:r>
-              <a:rPr lang="en-US" dirty="0"/>
-              <a:t>Pure story often has poor mechanics, or is simply watching a movie.  Why watch a movie holding a controller?</a:t>
-            </a:r>
-          </a:p>
-          <a:p>
-            <a:r>
-              <a:rPr lang="en-US" dirty="0"/>
-              <a:t>Pure mechanics often leads to lack of player motivation and interest.  Why use your agency in a world you don’t care about?</a:t>
+              <a:t>Are games a vehicle for telling a story?</a:t>
+            </a:r>
+          </a:p>
+          <a:p>
+            <a:r>
+              <a:rPr lang="en-US" dirty="0"/>
+              <a:t>Or are games about how we empower the player to do things they don’t normally get to do?</a:t>
+            </a:r>
+          </a:p>
+          <a:p>
+            <a:r>
+              <a:rPr lang="en-US" dirty="0"/>
+              <a:t>Is it the author’s voice we care about, or is it the gamers?</a:t>
             </a:r>
           </a:p>
         </p:txBody>
@@ -5271,7 +5354,7 @@
     </p:spTree>
     <p:extLst>
       <p:ext uri="{BB962C8B-B14F-4D97-AF65-F5344CB8AC3E}">
-        <p14:creationId xmlns:p14="http://schemas.microsoft.com/office/powerpoint/2010/main" val="3637041417"/>
+        <p14:creationId xmlns:p14="http://schemas.microsoft.com/office/powerpoint/2010/main" val="1420564653"/>
       </p:ext>
     </p:extLst>
   </p:cSld>
@@ -5413,15 +5496,7 @@
           <a:p>
             <a:r>
               <a:rPr lang="en-US" dirty="0"/>
-              <a:t>A </a:t>
-            </a:r>
-            <a:r>
-              <a:rPr lang="en-US" dirty="0" err="1"/>
-              <a:t>Playcentric</a:t>
-            </a:r>
-            <a:r>
-              <a:rPr lang="en-US" dirty="0"/>
-              <a:t> Approach</a:t>
+              <a:t>“I play it for the story”</a:t>
             </a:r>
           </a:p>
         </p:txBody>
@@ -5441,44 +5516,21 @@
           <a:bodyPr/>
           <a:lstStyle/>
           <a:p>
-            <a:endParaRPr lang="en-US" dirty="0"/>
-          </a:p>
-          <a:p>
-            <a:r>
-              <a:rPr lang="en-US" dirty="0"/>
-              <a:t>Gameplay MATTERS</a:t>
-            </a:r>
-          </a:p>
-          <a:p>
-            <a:r>
-              <a:rPr lang="en-US" dirty="0"/>
-              <a:t>This is your job as a game designer!</a:t>
-            </a:r>
-          </a:p>
-          <a:p>
-            <a:r>
-              <a:rPr lang="en-US" dirty="0"/>
-              <a:t>We will have to find graphics, audio, </a:t>
-            </a:r>
-            <a:r>
-              <a:rPr lang="en-US" dirty="0" err="1"/>
-              <a:t>etc</a:t>
-            </a:r>
-            <a:r>
-              <a:rPr lang="en-US" dirty="0"/>
-              <a:t> for our games, but our focus here is on GAMEPLAY</a:t>
-            </a:r>
-          </a:p>
-          <a:p>
-            <a:r>
-              <a:rPr lang="en-US" dirty="0"/>
-              <a:t>How do we think about gameplay?</a:t>
-            </a:r>
-          </a:p>
-          <a:p>
-            <a:r>
-              <a:rPr lang="en-US" dirty="0"/>
-              <a:t>How do we tease out game mechanics?</a:t>
+            <a:r>
+              <a:rPr lang="en-US" dirty="0"/>
+              <a:t>Name a game where the author’s voice is paramount – over that of the player’s.</a:t>
+            </a:r>
+          </a:p>
+          <a:p>
+            <a:r>
+              <a:rPr lang="en-US" dirty="0"/>
+              <a:t>Name a game where the player’s voice is paramount – over that of the author’s.</a:t>
+            </a:r>
+          </a:p>
+          <a:p>
+            <a:r>
+              <a:rPr lang="en-US" dirty="0"/>
+              <a:t>What characteristics do the two types of games have?</a:t>
             </a:r>
           </a:p>
         </p:txBody>
@@ -5502,6 +5554,257 @@
               <a:rPr lang="en-US" altLang="zh-CN" smtClean="0"/>
               <a:pPr/>
               <a:t>20</a:t>
+            </a:fld>
+            <a:endParaRPr lang="en-US" altLang="zh-CN"/>
+          </a:p>
+        </p:txBody>
+      </p:sp>
+    </p:spTree>
+    <p:extLst>
+      <p:ext uri="{BB962C8B-B14F-4D97-AF65-F5344CB8AC3E}">
+        <p14:creationId xmlns:p14="http://schemas.microsoft.com/office/powerpoint/2010/main" val="3967105160"/>
+      </p:ext>
+    </p:extLst>
+  </p:cSld>
+  <p:clrMapOvr>
+    <a:masterClrMapping/>
+  </p:clrMapOvr>
+</p:sld>
+</file>
+
+<file path=ppt/slides/slide21.xml><?xml version="1.0" encoding="utf-8"?>
+<p:sld xmlns:a="http://schemas.openxmlformats.org/drawingml/2006/main" xmlns:r="http://schemas.openxmlformats.org/officeDocument/2006/relationships" xmlns:p="http://schemas.openxmlformats.org/presentationml/2006/main">
+  <p:cSld>
+    <p:spTree>
+      <p:nvGrpSpPr>
+        <p:cNvPr id="1" name=""/>
+        <p:cNvGrpSpPr/>
+        <p:nvPr/>
+      </p:nvGrpSpPr>
+      <p:grpSpPr>
+        <a:xfrm>
+          <a:off x="0" y="0"/>
+          <a:ext cx="0" cy="0"/>
+          <a:chOff x="0" y="0"/>
+          <a:chExt cx="0" cy="0"/>
+        </a:xfrm>
+      </p:grpSpPr>
+      <p:sp>
+        <p:nvSpPr>
+          <p:cNvPr id="2" name="Title 1"/>
+          <p:cNvSpPr>
+            <a:spLocks noGrp="1"/>
+          </p:cNvSpPr>
+          <p:nvPr>
+            <p:ph type="title"/>
+          </p:nvPr>
+        </p:nvSpPr>
+        <p:spPr/>
+        <p:txBody>
+          <a:bodyPr/>
+          <a:lstStyle/>
+          <a:p>
+            <a:r>
+              <a:rPr lang="en-US" dirty="0"/>
+              <a:t>Beware the Extremes</a:t>
+            </a:r>
+          </a:p>
+        </p:txBody>
+      </p:sp>
+      <p:sp>
+        <p:nvSpPr>
+          <p:cNvPr id="3" name="Content Placeholder 2"/>
+          <p:cNvSpPr>
+            <a:spLocks noGrp="1"/>
+          </p:cNvSpPr>
+          <p:nvPr>
+            <p:ph idx="1"/>
+          </p:nvPr>
+        </p:nvSpPr>
+        <p:spPr/>
+        <p:txBody>
+          <a:bodyPr/>
+          <a:lstStyle/>
+          <a:p>
+            <a:r>
+              <a:rPr lang="en-US" dirty="0"/>
+              <a:t>Either extreme is dangerous.</a:t>
+            </a:r>
+          </a:p>
+          <a:p>
+            <a:r>
+              <a:rPr lang="en-US" dirty="0"/>
+              <a:t>Pure story often has poor mechanics, or is simply watching a movie.  Why watch a movie holding a controller?</a:t>
+            </a:r>
+          </a:p>
+          <a:p>
+            <a:r>
+              <a:rPr lang="en-US" dirty="0"/>
+              <a:t>Pure mechanics often leads to lack of player motivation and interest.  Why use your agency in a world you don’t care about?</a:t>
+            </a:r>
+          </a:p>
+        </p:txBody>
+      </p:sp>
+      <p:sp>
+        <p:nvSpPr>
+          <p:cNvPr id="4" name="Footer Placeholder 3"/>
+          <p:cNvSpPr>
+            <a:spLocks noGrp="1"/>
+          </p:cNvSpPr>
+          <p:nvPr>
+            <p:ph type="ftr" sz="quarter" idx="10"/>
+          </p:nvPr>
+        </p:nvSpPr>
+        <p:spPr/>
+        <p:txBody>
+          <a:bodyPr/>
+          <a:lstStyle/>
+          <a:p>
+            <a:fld id="{D0357299-C40C-42AB-B0C0-2E6E0A5A7F61}" type="slidenum">
+              <a:rPr lang="en-US" altLang="zh-CN" smtClean="0"/>
+              <a:pPr/>
+              <a:t>21</a:t>
+            </a:fld>
+            <a:endParaRPr lang="en-US" altLang="zh-CN"/>
+          </a:p>
+        </p:txBody>
+      </p:sp>
+    </p:spTree>
+    <p:extLst>
+      <p:ext uri="{BB962C8B-B14F-4D97-AF65-F5344CB8AC3E}">
+        <p14:creationId xmlns:p14="http://schemas.microsoft.com/office/powerpoint/2010/main" val="3637041417"/>
+      </p:ext>
+    </p:extLst>
+  </p:cSld>
+  <p:clrMapOvr>
+    <a:masterClrMapping/>
+  </p:clrMapOvr>
+</p:sld>
+</file>
+
+<file path=ppt/slides/slide22.xml><?xml version="1.0" encoding="utf-8"?>
+<p:sld xmlns:a="http://schemas.openxmlformats.org/drawingml/2006/main" xmlns:r="http://schemas.openxmlformats.org/officeDocument/2006/relationships" xmlns:p="http://schemas.openxmlformats.org/presentationml/2006/main">
+  <p:cSld>
+    <p:spTree>
+      <p:nvGrpSpPr>
+        <p:cNvPr id="1" name=""/>
+        <p:cNvGrpSpPr/>
+        <p:nvPr/>
+      </p:nvGrpSpPr>
+      <p:grpSpPr>
+        <a:xfrm>
+          <a:off x="0" y="0"/>
+          <a:ext cx="0" cy="0"/>
+          <a:chOff x="0" y="0"/>
+          <a:chExt cx="0" cy="0"/>
+        </a:xfrm>
+      </p:grpSpPr>
+      <p:sp>
+        <p:nvSpPr>
+          <p:cNvPr id="2" name="Title 1"/>
+          <p:cNvSpPr>
+            <a:spLocks noGrp="1"/>
+          </p:cNvSpPr>
+          <p:nvPr>
+            <p:ph type="title"/>
+          </p:nvPr>
+        </p:nvSpPr>
+        <p:spPr/>
+        <p:txBody>
+          <a:bodyPr/>
+          <a:lstStyle/>
+          <a:p>
+            <a:r>
+              <a:rPr lang="en-US" dirty="0"/>
+              <a:t>A </a:t>
+            </a:r>
+            <a:r>
+              <a:rPr lang="en-US" dirty="0" err="1"/>
+              <a:t>Playcentric</a:t>
+            </a:r>
+            <a:r>
+              <a:rPr lang="en-US" dirty="0"/>
+              <a:t> Approach</a:t>
+            </a:r>
+          </a:p>
+        </p:txBody>
+      </p:sp>
+      <p:sp>
+        <p:nvSpPr>
+          <p:cNvPr id="3" name="Content Placeholder 2"/>
+          <p:cNvSpPr>
+            <a:spLocks noGrp="1"/>
+          </p:cNvSpPr>
+          <p:nvPr>
+            <p:ph idx="1"/>
+          </p:nvPr>
+        </p:nvSpPr>
+        <p:spPr/>
+        <p:txBody>
+          <a:bodyPr/>
+          <a:lstStyle/>
+          <a:p>
+            <a:endParaRPr lang="en-US" dirty="0"/>
+          </a:p>
+          <a:p>
+            <a:r>
+              <a:rPr lang="en-US" dirty="0"/>
+              <a:t>Gameplay MATTERS</a:t>
+            </a:r>
+          </a:p>
+          <a:p>
+            <a:r>
+              <a:rPr lang="en-US" dirty="0"/>
+              <a:t>This is your job as a game designer!</a:t>
+            </a:r>
+          </a:p>
+          <a:p>
+            <a:r>
+              <a:rPr lang="en-US" dirty="0"/>
+              <a:t>We will have to find graphics, audio, </a:t>
+            </a:r>
+            <a:r>
+              <a:rPr lang="en-US" dirty="0" err="1"/>
+              <a:t>etc</a:t>
+            </a:r>
+            <a:r>
+              <a:rPr lang="en-US" dirty="0"/>
+              <a:t> for our games, but our focus here is on GAMEPLAY</a:t>
+            </a:r>
+          </a:p>
+          <a:p>
+            <a:r>
+              <a:rPr lang="en-US" dirty="0"/>
+              <a:t>How do we think about gameplay?</a:t>
+            </a:r>
+          </a:p>
+          <a:p>
+            <a:r>
+              <a:rPr lang="en-US" dirty="0"/>
+              <a:t>How do we tease out game mechanics?</a:t>
+            </a:r>
+          </a:p>
+        </p:txBody>
+      </p:sp>
+      <p:sp>
+        <p:nvSpPr>
+          <p:cNvPr id="4" name="Footer Placeholder 3"/>
+          <p:cNvSpPr>
+            <a:spLocks noGrp="1"/>
+          </p:cNvSpPr>
+          <p:nvPr>
+            <p:ph type="ftr" sz="quarter" idx="10"/>
+          </p:nvPr>
+        </p:nvSpPr>
+        <p:spPr/>
+        <p:txBody>
+          <a:bodyPr/>
+          <a:lstStyle/>
+          <a:p>
+            <a:fld id="{D0357299-C40C-42AB-B0C0-2E6E0A5A7F61}" type="slidenum">
+              <a:rPr lang="en-US" altLang="zh-CN" smtClean="0"/>
+              <a:pPr/>
+              <a:t>22</a:t>
             </a:fld>
             <a:endParaRPr lang="en-US" altLang="zh-CN"/>
           </a:p>
@@ -6851,7 +7154,25 @@
           <a:p>
             <a:r>
               <a:rPr lang="en-US" dirty="0"/>
-              <a:t>Why do you play games?  Or why do people play games in general?</a:t>
+              <a:t>Escapism</a:t>
+            </a:r>
+          </a:p>
+          <a:p>
+            <a:r>
+              <a:rPr lang="en-US" dirty="0"/>
+              <a:t>Narrative</a:t>
+            </a:r>
+          </a:p>
+          <a:p>
+            <a:r>
+              <a:rPr lang="en-US" dirty="0"/>
+              <a:t>Victory</a:t>
+            </a:r>
+          </a:p>
+          <a:p>
+            <a:r>
+              <a:rPr lang="en-US" dirty="0"/>
+              <a:t>(a whole lot more…)</a:t>
             </a:r>
           </a:p>
         </p:txBody>
@@ -6883,7 +7204,7 @@
     </p:spTree>
     <p:extLst>
       <p:ext uri="{BB962C8B-B14F-4D97-AF65-F5344CB8AC3E}">
-        <p14:creationId xmlns:p14="http://schemas.microsoft.com/office/powerpoint/2010/main" val="2936056178"/>
+        <p14:creationId xmlns:p14="http://schemas.microsoft.com/office/powerpoint/2010/main" val="1595411137"/>
       </p:ext>
     </p:extLst>
   </p:cSld>

</xml_diff>